<commit_message>
add disease sample ontology
</commit_message>
<xml_diff>
--- a/使用Protégé建立中国传统医学本体模型.pptx
+++ b/使用Protégé建立中国传统医学本体模型.pptx
@@ -5,7 +5,7 @@
     <p:sldMasterId id="2147483684" r:id="rId1"/>
   </p:sldMasterIdLst>
   <p:notesMasterIdLst>
-    <p:notesMasterId r:id="rId12"/>
+    <p:notesMasterId r:id="rId13"/>
   </p:notesMasterIdLst>
   <p:sldIdLst>
     <p:sldId id="272" r:id="rId2"/>
@@ -18,6 +18,7 @@
     <p:sldId id="279" r:id="rId9"/>
     <p:sldId id="280" r:id="rId10"/>
     <p:sldId id="281" r:id="rId11"/>
+    <p:sldId id="282" r:id="rId12"/>
   </p:sldIdLst>
   <p:sldSz cx="12192000" cy="6858000"/>
   <p:notesSz cx="6858000" cy="9144000"/>
@@ -206,7 +207,7 @@
           <a:p>
             <a:fld id="{71BD4573-58E7-4156-A133-2731F5F8D1A6}" type="datetimeFigureOut">
               <a:rPr lang="en-US" smtClean="0"/>
-              <a:t>4/7/2024</a:t>
+              <a:t>8/20/2024</a:t>
             </a:fld>
             <a:endParaRPr lang="en-US"/>
           </a:p>
@@ -1687,7 +1688,7 @@
           <a:p>
             <a:fld id="{021A1D30-C0A0-4124-A783-34D9F15FA0FE}" type="datetime1">
               <a:rPr lang="en-US" smtClean="0"/>
-              <a:t>4/7/2024</a:t>
+              <a:t>8/20/2024</a:t>
             </a:fld>
             <a:endParaRPr lang="en-US"/>
           </a:p>
@@ -1871,7 +1872,7 @@
           <a:p>
             <a:fld id="{8D2D5871-AB0F-4B3D-8861-97E78CB7B47E}" type="datetime1">
               <a:rPr lang="en-US" smtClean="0"/>
-              <a:t>4/7/2024</a:t>
+              <a:t>8/20/2024</a:t>
             </a:fld>
             <a:endParaRPr lang="en-US"/>
           </a:p>
@@ -2065,7 +2066,7 @@
           <a:p>
             <a:fld id="{14418406-4C3F-4F3E-80BD-A22568EA37EB}" type="datetime1">
               <a:rPr lang="en-US" smtClean="0"/>
-              <a:t>4/7/2024</a:t>
+              <a:t>8/20/2024</a:t>
             </a:fld>
             <a:endParaRPr lang="en-US"/>
           </a:p>
@@ -2249,7 +2250,7 @@
           <a:p>
             <a:fld id="{65F28077-7188-48C5-8679-2287FAC952E9}" type="datetime1">
               <a:rPr lang="en-US" smtClean="0"/>
-              <a:t>4/7/2024</a:t>
+              <a:t>8/20/2024</a:t>
             </a:fld>
             <a:endParaRPr lang="en-US"/>
           </a:p>
@@ -2496,7 +2497,7 @@
           <a:p>
             <a:fld id="{D2DCB740-6776-4EE9-99FD-96D592FA5A23}" type="datetime1">
               <a:rPr lang="en-US" smtClean="0"/>
-              <a:t>4/7/2024</a:t>
+              <a:t>8/20/2024</a:t>
             </a:fld>
             <a:endParaRPr lang="en-US"/>
           </a:p>
@@ -2779,7 +2780,7 @@
           <a:p>
             <a:fld id="{05F6BD99-6FFD-46C5-B5E2-43A34BDA2566}" type="datetime1">
               <a:rPr lang="en-US" smtClean="0"/>
-              <a:t>4/7/2024</a:t>
+              <a:t>8/20/2024</a:t>
             </a:fld>
             <a:endParaRPr lang="en-US"/>
           </a:p>
@@ -3176,7 +3177,7 @@
           <a:p>
             <a:fld id="{E022678E-214C-4CF8-97C7-95015FB02960}" type="datetime1">
               <a:rPr lang="en-US" smtClean="0"/>
-              <a:t>4/7/2024</a:t>
+              <a:t>8/20/2024</a:t>
             </a:fld>
             <a:endParaRPr lang="en-US"/>
           </a:p>
@@ -3345,7 +3346,7 @@
           <a:p>
             <a:fld id="{D55660E0-FA77-4473-A859-74127B089143}" type="datetime1">
               <a:rPr lang="en-US" smtClean="0"/>
-              <a:t>4/7/2024</a:t>
+              <a:t>8/20/2024</a:t>
             </a:fld>
             <a:endParaRPr lang="en-US"/>
           </a:p>
@@ -3455,7 +3456,7 @@
           <a:p>
             <a:fld id="{3188D7B8-9F07-4899-827D-5F3CFDDEB574}" type="datetime1">
               <a:rPr lang="en-US" smtClean="0"/>
-              <a:t>4/7/2024</a:t>
+              <a:t>8/20/2024</a:t>
             </a:fld>
             <a:endParaRPr lang="en-US"/>
           </a:p>
@@ -3735,7 +3736,7 @@
           <a:p>
             <a:fld id="{B5197C5C-1CD1-417D-A89C-14747F5222C7}" type="datetime1">
               <a:rPr lang="en-US" smtClean="0"/>
-              <a:t>4/7/2024</a:t>
+              <a:t>8/20/2024</a:t>
             </a:fld>
             <a:endParaRPr lang="en-US"/>
           </a:p>
@@ -4088,7 +4089,7 @@
           <a:p>
             <a:fld id="{1359EFBB-CFA1-4AA8-9123-F0B52DBD84FE}" type="datetime1">
               <a:rPr lang="en-US" smtClean="0"/>
-              <a:t>4/7/2024</a:t>
+              <a:t>8/20/2024</a:t>
             </a:fld>
             <a:endParaRPr lang="en-US"/>
           </a:p>
@@ -5122,7 +5123,7 @@
             <a:fld id="{61146459-E3C3-4969-9224-5ED50B492D17}" type="datetime1">
               <a:rPr lang="en-US" smtClean="0"/>
               <a:pPr/>
-              <a:t>4/7/2024</a:t>
+              <a:t>8/20/2024</a:t>
             </a:fld>
             <a:endParaRPr lang="en-US" dirty="0"/>
           </a:p>
@@ -6305,13 +6306,275 @@
   <p:clrMapOvr>
     <a:masterClrMapping/>
   </p:clrMapOvr>
-  <mc:AlternateContent xmlns:mc="http://schemas.openxmlformats.org/markup-compatibility/2006">
-    <mc:Choice xmlns:p14="http://schemas.microsoft.com/office/powerpoint/2010/main" Requires="p14">
+  <mc:AlternateContent xmlns:mc="http://schemas.openxmlformats.org/markup-compatibility/2006" xmlns:p14="http://schemas.microsoft.com/office/powerpoint/2010/main">
+    <mc:Choice Requires="p14">
       <p:transition spd="med" p14:dur="700">
         <p:fade/>
       </p:transition>
     </mc:Choice>
-    <mc:Fallback>
+    <mc:Fallback xmlns="">
+      <p:transition spd="med">
+        <p:fade/>
+      </p:transition>
+    </mc:Fallback>
+  </mc:AlternateContent>
+</p:sld>
+</file>
+
+<file path=ppt/slides/slide11.xml><?xml version="1.0" encoding="utf-8"?>
+<p:sld xmlns:a="http://schemas.openxmlformats.org/drawingml/2006/main" xmlns:r="http://schemas.openxmlformats.org/officeDocument/2006/relationships" xmlns:p="http://schemas.openxmlformats.org/presentationml/2006/main">
+  <p:cSld>
+    <p:spTree>
+      <p:nvGrpSpPr>
+        <p:cNvPr id="1" name=""/>
+        <p:cNvGrpSpPr/>
+        <p:nvPr/>
+      </p:nvGrpSpPr>
+      <p:grpSpPr>
+        <a:xfrm>
+          <a:off x="0" y="0"/>
+          <a:ext cx="0" cy="0"/>
+          <a:chOff x="0" y="0"/>
+          <a:chExt cx="0" cy="0"/>
+        </a:xfrm>
+      </p:grpSpPr>
+      <p:sp>
+        <p:nvSpPr>
+          <p:cNvPr id="2" name="Title 1">
+            <a:extLst>
+              <a:ext uri="{FF2B5EF4-FFF2-40B4-BE49-F238E27FC236}">
+                <a16:creationId xmlns:a16="http://schemas.microsoft.com/office/drawing/2014/main" id="{CEBE3E15-F6F7-6828-232B-F95EB2D2F43D}"/>
+              </a:ext>
+            </a:extLst>
+          </p:cNvPr>
+          <p:cNvSpPr>
+            <a:spLocks noGrp="1"/>
+          </p:cNvSpPr>
+          <p:nvPr>
+            <p:ph type="title"/>
+          </p:nvPr>
+        </p:nvSpPr>
+        <p:spPr/>
+        <p:txBody>
+          <a:bodyPr/>
+          <a:lstStyle/>
+          <a:p>
+            <a:r>
+              <a:rPr lang="zh-CN" altLang="en-US"/>
+              <a:t>本体构建问题</a:t>
+            </a:r>
+            <a:r>
+              <a:rPr lang="zh-CN" altLang="en-US" dirty="0"/>
+              <a:t>解析</a:t>
+            </a:r>
+            <a:endParaRPr lang="en-US" dirty="0"/>
+          </a:p>
+        </p:txBody>
+      </p:sp>
+      <p:sp>
+        <p:nvSpPr>
+          <p:cNvPr id="3" name="Content Placeholder 2">
+            <a:extLst>
+              <a:ext uri="{FF2B5EF4-FFF2-40B4-BE49-F238E27FC236}">
+                <a16:creationId xmlns:a16="http://schemas.microsoft.com/office/drawing/2014/main" id="{BD8443D5-62EC-C96C-CE13-450C026A15F3}"/>
+              </a:ext>
+            </a:extLst>
+          </p:cNvPr>
+          <p:cNvSpPr>
+            <a:spLocks noGrp="1"/>
+          </p:cNvSpPr>
+          <p:nvPr>
+            <p:ph idx="1"/>
+          </p:nvPr>
+        </p:nvSpPr>
+        <p:spPr>
+          <a:xfrm>
+            <a:off x="609600" y="1935480"/>
+            <a:ext cx="7026656" cy="4389120"/>
+          </a:xfrm>
+        </p:spPr>
+        <p:txBody>
+          <a:bodyPr/>
+          <a:lstStyle/>
+          <a:p>
+            <a:pPr marL="514350" indent="-514350">
+              <a:buFont typeface="+mj-lt"/>
+              <a:buAutoNum type="arabicPeriod"/>
+            </a:pPr>
+            <a:r>
+              <a:rPr lang="zh-CN" altLang="en-US" dirty="0"/>
+              <a:t>一个疾病本体，在疾病下有症状</a:t>
+            </a:r>
+            <a:r>
+              <a:rPr lang="en-US" altLang="zh-CN" dirty="0"/>
+              <a:t>/</a:t>
+            </a:r>
+            <a:r>
+              <a:rPr lang="zh-CN" altLang="en-US" dirty="0"/>
+              <a:t>诊断</a:t>
+            </a:r>
+            <a:r>
+              <a:rPr lang="en-US" altLang="zh-CN" dirty="0"/>
+              <a:t>/</a:t>
+            </a:r>
+            <a:r>
+              <a:rPr lang="zh-CN" altLang="en-US" dirty="0"/>
+              <a:t>干预等</a:t>
+            </a:r>
+            <a:r>
+              <a:rPr lang="en-US" altLang="zh-CN" dirty="0"/>
+              <a:t>subclass</a:t>
+            </a:r>
+            <a:r>
+              <a:rPr lang="zh-CN" altLang="en-US" dirty="0"/>
+              <a:t>，那么是否还需要构建</a:t>
+            </a:r>
+            <a:r>
+              <a:rPr lang="en-US" altLang="zh-CN" dirty="0"/>
+              <a:t>object properties</a:t>
+            </a:r>
+            <a:r>
+              <a:rPr lang="zh-CN" altLang="en-US" dirty="0"/>
+              <a:t>呢？或者是否需要重新设立一个 症状</a:t>
+            </a:r>
+            <a:r>
+              <a:rPr lang="en-US" altLang="zh-CN" dirty="0"/>
+              <a:t>/</a:t>
+            </a:r>
+            <a:r>
+              <a:rPr lang="zh-CN" altLang="en-US" dirty="0"/>
+              <a:t>诊断</a:t>
+            </a:r>
+            <a:r>
+              <a:rPr lang="en-US" altLang="zh-CN" dirty="0"/>
+              <a:t>/</a:t>
+            </a:r>
+            <a:r>
+              <a:rPr lang="zh-CN" altLang="en-US" dirty="0"/>
+              <a:t>干预的</a:t>
+            </a:r>
+            <a:r>
+              <a:rPr lang="en-US" altLang="zh-CN" dirty="0"/>
+              <a:t>class</a:t>
+            </a:r>
+            <a:r>
+              <a:rPr lang="zh-CN" altLang="en-US" dirty="0"/>
+              <a:t>，再构建其和疾病之间的关系？</a:t>
+            </a:r>
+          </a:p>
+          <a:p>
+            <a:pPr marL="514350" indent="-514350">
+              <a:buFont typeface="+mj-lt"/>
+              <a:buAutoNum type="arabicPeriod"/>
+            </a:pPr>
+            <a:endParaRPr lang="zh-CN" altLang="en-US" dirty="0"/>
+          </a:p>
+          <a:p>
+            <a:pPr marL="514350" indent="-514350">
+              <a:buFont typeface="+mj-lt"/>
+              <a:buAutoNum type="arabicPeriod"/>
+            </a:pPr>
+            <a:r>
+              <a:rPr lang="zh-CN" altLang="en-US" dirty="0"/>
+              <a:t>对于一个实体，其定义描述是放在</a:t>
+            </a:r>
+            <a:r>
+              <a:rPr lang="en-US" altLang="zh-CN" dirty="0"/>
+              <a:t>annotation</a:t>
+            </a:r>
+            <a:r>
+              <a:rPr lang="zh-CN" altLang="en-US" dirty="0"/>
+              <a:t>的</a:t>
+            </a:r>
+            <a:r>
+              <a:rPr lang="en-US" altLang="zh-CN" dirty="0"/>
+              <a:t>comment</a:t>
+            </a:r>
+            <a:r>
+              <a:rPr lang="zh-CN" altLang="en-US" dirty="0"/>
+              <a:t>中呢，还是在</a:t>
+            </a:r>
+            <a:r>
+              <a:rPr lang="en-US" altLang="zh-CN" dirty="0"/>
+              <a:t>data properties</a:t>
+            </a:r>
+            <a:r>
+              <a:rPr lang="zh-CN" altLang="en-US" dirty="0"/>
+              <a:t>中设立一个</a:t>
+            </a:r>
+            <a:r>
+              <a:rPr lang="en-US" altLang="zh-CN" dirty="0"/>
+              <a:t>【</a:t>
+            </a:r>
+            <a:r>
+              <a:rPr lang="zh-CN" altLang="en-US" dirty="0"/>
+              <a:t>描述</a:t>
+            </a:r>
+            <a:r>
+              <a:rPr lang="en-US" altLang="zh-CN" dirty="0"/>
+              <a:t>】</a:t>
+            </a:r>
+            <a:r>
+              <a:rPr lang="zh-CN" altLang="en-US" dirty="0"/>
+              <a:t>，给每个实体添加这个属性呢？</a:t>
+            </a:r>
+          </a:p>
+          <a:p>
+            <a:pPr marL="514350" indent="-514350">
+              <a:buFont typeface="+mj-lt"/>
+              <a:buAutoNum type="arabicPeriod"/>
+            </a:pPr>
+            <a:endParaRPr lang="en-US" dirty="0"/>
+          </a:p>
+        </p:txBody>
+      </p:sp>
+      <p:pic>
+        <p:nvPicPr>
+          <p:cNvPr id="5" name="Picture 4">
+            <a:extLst>
+              <a:ext uri="{FF2B5EF4-FFF2-40B4-BE49-F238E27FC236}">
+                <a16:creationId xmlns:a16="http://schemas.microsoft.com/office/drawing/2014/main" id="{30E370DD-04A4-E194-45A5-159506250CE4}"/>
+              </a:ext>
+            </a:extLst>
+          </p:cNvPr>
+          <p:cNvPicPr>
+            <a:picLocks noChangeAspect="1"/>
+          </p:cNvPicPr>
+          <p:nvPr/>
+        </p:nvPicPr>
+        <p:blipFill>
+          <a:blip r:embed="rId2"/>
+          <a:stretch>
+            <a:fillRect/>
+          </a:stretch>
+        </p:blipFill>
+        <p:spPr>
+          <a:xfrm>
+            <a:off x="7636256" y="1935480"/>
+            <a:ext cx="4225163" cy="3230480"/>
+          </a:xfrm>
+          <a:prstGeom prst="rect">
+            <a:avLst/>
+          </a:prstGeom>
+        </p:spPr>
+      </p:pic>
+    </p:spTree>
+    <p:extLst>
+      <p:ext uri="{BB962C8B-B14F-4D97-AF65-F5344CB8AC3E}">
+        <p14:creationId xmlns:p14="http://schemas.microsoft.com/office/powerpoint/2010/main" val="2094464164"/>
+      </p:ext>
+    </p:extLst>
+  </p:cSld>
+  <p:clrMapOvr>
+    <a:masterClrMapping/>
+  </p:clrMapOvr>
+  <mc:AlternateContent xmlns:mc="http://schemas.openxmlformats.org/markup-compatibility/2006" xmlns:p14="http://schemas.microsoft.com/office/powerpoint/2010/main">
+    <mc:Choice Requires="p14">
+      <p:transition spd="med" p14:dur="700">
+        <p:fade/>
+      </p:transition>
+    </mc:Choice>
+    <mc:Fallback xmlns="">
       <p:transition spd="med">
         <p:fade/>
       </p:transition>

</xml_diff>